<commit_message>
Added title in ppt file
Added title in ppt file
</commit_message>
<xml_diff>
--- a/task1_pcapng.pptx
+++ b/task1_pcapng.pptx
@@ -243,7 +243,7 @@
           <a:p>
             <a:fld id="{D16AA633-F3CA-4472-97BE-AF501E1D2B31}" type="datetimeFigureOut">
               <a:rPr lang="en-NZ" smtClean="0"/>
-              <a:t>21/04/2017</a:t>
+              <a:t>23/04/2017</a:t>
             </a:fld>
             <a:endParaRPr lang="en-NZ"/>
           </a:p>
@@ -413,7 +413,7 @@
           <a:p>
             <a:fld id="{D16AA633-F3CA-4472-97BE-AF501E1D2B31}" type="datetimeFigureOut">
               <a:rPr lang="en-NZ" smtClean="0"/>
-              <a:t>21/04/2017</a:t>
+              <a:t>23/04/2017</a:t>
             </a:fld>
             <a:endParaRPr lang="en-NZ"/>
           </a:p>
@@ -593,7 +593,7 @@
           <a:p>
             <a:fld id="{D16AA633-F3CA-4472-97BE-AF501E1D2B31}" type="datetimeFigureOut">
               <a:rPr lang="en-NZ" smtClean="0"/>
-              <a:t>21/04/2017</a:t>
+              <a:t>23/04/2017</a:t>
             </a:fld>
             <a:endParaRPr lang="en-NZ"/>
           </a:p>
@@ -763,7 +763,7 @@
           <a:p>
             <a:fld id="{D16AA633-F3CA-4472-97BE-AF501E1D2B31}" type="datetimeFigureOut">
               <a:rPr lang="en-NZ" smtClean="0"/>
-              <a:t>21/04/2017</a:t>
+              <a:t>23/04/2017</a:t>
             </a:fld>
             <a:endParaRPr lang="en-NZ"/>
           </a:p>
@@ -1009,7 +1009,7 @@
           <a:p>
             <a:fld id="{D16AA633-F3CA-4472-97BE-AF501E1D2B31}" type="datetimeFigureOut">
               <a:rPr lang="en-NZ" smtClean="0"/>
-              <a:t>21/04/2017</a:t>
+              <a:t>23/04/2017</a:t>
             </a:fld>
             <a:endParaRPr lang="en-NZ"/>
           </a:p>
@@ -1241,7 +1241,7 @@
           <a:p>
             <a:fld id="{D16AA633-F3CA-4472-97BE-AF501E1D2B31}" type="datetimeFigureOut">
               <a:rPr lang="en-NZ" smtClean="0"/>
-              <a:t>21/04/2017</a:t>
+              <a:t>23/04/2017</a:t>
             </a:fld>
             <a:endParaRPr lang="en-NZ"/>
           </a:p>
@@ -1608,7 +1608,7 @@
           <a:p>
             <a:fld id="{D16AA633-F3CA-4472-97BE-AF501E1D2B31}" type="datetimeFigureOut">
               <a:rPr lang="en-NZ" smtClean="0"/>
-              <a:t>21/04/2017</a:t>
+              <a:t>23/04/2017</a:t>
             </a:fld>
             <a:endParaRPr lang="en-NZ"/>
           </a:p>
@@ -1726,7 +1726,7 @@
           <a:p>
             <a:fld id="{D16AA633-F3CA-4472-97BE-AF501E1D2B31}" type="datetimeFigureOut">
               <a:rPr lang="en-NZ" smtClean="0"/>
-              <a:t>21/04/2017</a:t>
+              <a:t>23/04/2017</a:t>
             </a:fld>
             <a:endParaRPr lang="en-NZ"/>
           </a:p>
@@ -1821,7 +1821,7 @@
           <a:p>
             <a:fld id="{D16AA633-F3CA-4472-97BE-AF501E1D2B31}" type="datetimeFigureOut">
               <a:rPr lang="en-NZ" smtClean="0"/>
-              <a:t>21/04/2017</a:t>
+              <a:t>23/04/2017</a:t>
             </a:fld>
             <a:endParaRPr lang="en-NZ"/>
           </a:p>
@@ -2098,7 +2098,7 @@
           <a:p>
             <a:fld id="{D16AA633-F3CA-4472-97BE-AF501E1D2B31}" type="datetimeFigureOut">
               <a:rPr lang="en-NZ" smtClean="0"/>
-              <a:t>21/04/2017</a:t>
+              <a:t>23/04/2017</a:t>
             </a:fld>
             <a:endParaRPr lang="en-NZ"/>
           </a:p>
@@ -2351,7 +2351,7 @@
           <a:p>
             <a:fld id="{D16AA633-F3CA-4472-97BE-AF501E1D2B31}" type="datetimeFigureOut">
               <a:rPr lang="en-NZ" smtClean="0"/>
-              <a:t>21/04/2017</a:t>
+              <a:t>23/04/2017</a:t>
             </a:fld>
             <a:endParaRPr lang="en-NZ"/>
           </a:p>
@@ -2564,7 +2564,7 @@
           <a:p>
             <a:fld id="{D16AA633-F3CA-4472-97BE-AF501E1D2B31}" type="datetimeFigureOut">
               <a:rPr lang="en-NZ" smtClean="0"/>
-              <a:t>21/04/2017</a:t>
+              <a:t>23/04/2017</a:t>
             </a:fld>
             <a:endParaRPr lang="en-NZ"/>
           </a:p>
@@ -3099,7 +3099,7 @@
         </p:nvSpPr>
         <p:spPr>
           <a:xfrm>
-            <a:off x="265146" y="251929"/>
+            <a:off x="265145" y="1705664"/>
             <a:ext cx="2491273" cy="1200329"/>
           </a:xfrm>
           <a:prstGeom prst="rect">
@@ -3166,7 +3166,7 @@
         </p:blipFill>
         <p:spPr bwMode="auto">
           <a:xfrm>
-            <a:off x="265146" y="1906536"/>
+            <a:off x="502782" y="2959056"/>
             <a:ext cx="2016000" cy="2016000"/>
           </a:xfrm>
           <a:prstGeom prst="rect">
@@ -3380,6 +3380,55 @@
               <a:rPr lang="en-NZ" altLang="zh-TW" dirty="0"/>
               <a:t>as mentioned in the question</a:t>
             </a:r>
+            <a:endParaRPr lang="en-NZ" dirty="0"/>
+          </a:p>
+        </p:txBody>
+      </p:sp>
+      <p:sp>
+        <p:nvSpPr>
+          <p:cNvPr id="9" name="TextBox 8"/>
+          <p:cNvSpPr txBox="1"/>
+          <p:nvPr/>
+        </p:nvSpPr>
+        <p:spPr>
+          <a:xfrm>
+            <a:off x="391886" y="152210"/>
+            <a:ext cx="3195734" cy="1200329"/>
+          </a:xfrm>
+          <a:prstGeom prst="rect">
+            <a:avLst/>
+          </a:prstGeom>
+          <a:noFill/>
+          <a:ln>
+            <a:solidFill>
+              <a:schemeClr val="tx1"/>
+            </a:solidFill>
+          </a:ln>
+        </p:spPr>
+        <p:txBody>
+          <a:bodyPr wrap="square" rtlCol="0">
+            <a:spAutoFit/>
+          </a:bodyPr>
+          <a:lstStyle/>
+          <a:p>
+            <a:r>
+              <a:rPr lang="en-NZ" dirty="0"/>
+              <a:t>SOFTENG 364 Assignment 1</a:t>
+            </a:r>
+          </a:p>
+          <a:p>
+            <a:r>
+              <a:rPr lang="en-NZ" dirty="0"/>
+              <a:t>840454023, elee353</a:t>
+            </a:r>
+          </a:p>
+          <a:p>
+            <a:r>
+              <a:rPr lang="en-NZ" dirty="0"/>
+              <a:t>Task 1.</a:t>
+            </a:r>
+          </a:p>
+          <a:p>
             <a:endParaRPr lang="en-NZ" dirty="0"/>
           </a:p>
         </p:txBody>

</xml_diff>

<commit_message>
Gave up RTT Q7
Gave up RTT Q7
</commit_message>
<xml_diff>
--- a/task1_pcapng.pptx
+++ b/task1_pcapng.pptx
@@ -243,7 +243,7 @@
           <a:p>
             <a:fld id="{D16AA633-F3CA-4472-97BE-AF501E1D2B31}" type="datetimeFigureOut">
               <a:rPr lang="en-NZ" smtClean="0"/>
-              <a:t>23/04/2017</a:t>
+              <a:t>26/04/2017</a:t>
             </a:fld>
             <a:endParaRPr lang="en-NZ"/>
           </a:p>
@@ -413,7 +413,7 @@
           <a:p>
             <a:fld id="{D16AA633-F3CA-4472-97BE-AF501E1D2B31}" type="datetimeFigureOut">
               <a:rPr lang="en-NZ" smtClean="0"/>
-              <a:t>23/04/2017</a:t>
+              <a:t>26/04/2017</a:t>
             </a:fld>
             <a:endParaRPr lang="en-NZ"/>
           </a:p>
@@ -593,7 +593,7 @@
           <a:p>
             <a:fld id="{D16AA633-F3CA-4472-97BE-AF501E1D2B31}" type="datetimeFigureOut">
               <a:rPr lang="en-NZ" smtClean="0"/>
-              <a:t>23/04/2017</a:t>
+              <a:t>26/04/2017</a:t>
             </a:fld>
             <a:endParaRPr lang="en-NZ"/>
           </a:p>
@@ -763,7 +763,7 @@
           <a:p>
             <a:fld id="{D16AA633-F3CA-4472-97BE-AF501E1D2B31}" type="datetimeFigureOut">
               <a:rPr lang="en-NZ" smtClean="0"/>
-              <a:t>23/04/2017</a:t>
+              <a:t>26/04/2017</a:t>
             </a:fld>
             <a:endParaRPr lang="en-NZ"/>
           </a:p>
@@ -1009,7 +1009,7 @@
           <a:p>
             <a:fld id="{D16AA633-F3CA-4472-97BE-AF501E1D2B31}" type="datetimeFigureOut">
               <a:rPr lang="en-NZ" smtClean="0"/>
-              <a:t>23/04/2017</a:t>
+              <a:t>26/04/2017</a:t>
             </a:fld>
             <a:endParaRPr lang="en-NZ"/>
           </a:p>
@@ -1241,7 +1241,7 @@
           <a:p>
             <a:fld id="{D16AA633-F3CA-4472-97BE-AF501E1D2B31}" type="datetimeFigureOut">
               <a:rPr lang="en-NZ" smtClean="0"/>
-              <a:t>23/04/2017</a:t>
+              <a:t>26/04/2017</a:t>
             </a:fld>
             <a:endParaRPr lang="en-NZ"/>
           </a:p>
@@ -1608,7 +1608,7 @@
           <a:p>
             <a:fld id="{D16AA633-F3CA-4472-97BE-AF501E1D2B31}" type="datetimeFigureOut">
               <a:rPr lang="en-NZ" smtClean="0"/>
-              <a:t>23/04/2017</a:t>
+              <a:t>26/04/2017</a:t>
             </a:fld>
             <a:endParaRPr lang="en-NZ"/>
           </a:p>
@@ -1726,7 +1726,7 @@
           <a:p>
             <a:fld id="{D16AA633-F3CA-4472-97BE-AF501E1D2B31}" type="datetimeFigureOut">
               <a:rPr lang="en-NZ" smtClean="0"/>
-              <a:t>23/04/2017</a:t>
+              <a:t>26/04/2017</a:t>
             </a:fld>
             <a:endParaRPr lang="en-NZ"/>
           </a:p>
@@ -1821,7 +1821,7 @@
           <a:p>
             <a:fld id="{D16AA633-F3CA-4472-97BE-AF501E1D2B31}" type="datetimeFigureOut">
               <a:rPr lang="en-NZ" smtClean="0"/>
-              <a:t>23/04/2017</a:t>
+              <a:t>26/04/2017</a:t>
             </a:fld>
             <a:endParaRPr lang="en-NZ"/>
           </a:p>
@@ -2098,7 +2098,7 @@
           <a:p>
             <a:fld id="{D16AA633-F3CA-4472-97BE-AF501E1D2B31}" type="datetimeFigureOut">
               <a:rPr lang="en-NZ" smtClean="0"/>
-              <a:t>23/04/2017</a:t>
+              <a:t>26/04/2017</a:t>
             </a:fld>
             <a:endParaRPr lang="en-NZ"/>
           </a:p>
@@ -2351,7 +2351,7 @@
           <a:p>
             <a:fld id="{D16AA633-F3CA-4472-97BE-AF501E1D2B31}" type="datetimeFigureOut">
               <a:rPr lang="en-NZ" smtClean="0"/>
-              <a:t>23/04/2017</a:t>
+              <a:t>26/04/2017</a:t>
             </a:fld>
             <a:endParaRPr lang="en-NZ"/>
           </a:p>
@@ -2564,7 +2564,7 @@
           <a:p>
             <a:fld id="{D16AA633-F3CA-4472-97BE-AF501E1D2B31}" type="datetimeFigureOut">
               <a:rPr lang="en-NZ" smtClean="0"/>
-              <a:t>23/04/2017</a:t>
+              <a:t>26/04/2017</a:t>
             </a:fld>
             <a:endParaRPr lang="en-NZ"/>
           </a:p>
@@ -3086,7 +3086,7 @@
           <a:p>
             <a:r>
               <a:rPr lang="en-NZ" dirty="0"/>
-              <a:t>(Client)</a:t>
+              <a:t>(Router)</a:t>
             </a:r>
           </a:p>
         </p:txBody>
@@ -3225,9 +3225,43 @@
           </a:extLst>
         </p:spPr>
       </p:pic>
+      <p:sp>
+        <p:nvSpPr>
+          <p:cNvPr id="2" name="TextBox 1"/>
+          <p:cNvSpPr txBox="1"/>
+          <p:nvPr/>
+        </p:nvSpPr>
+        <p:spPr>
+          <a:xfrm>
+            <a:off x="597159" y="6027576"/>
+            <a:ext cx="5980923" cy="400110"/>
+          </a:xfrm>
+          <a:prstGeom prst="rect">
+            <a:avLst/>
+          </a:prstGeom>
+          <a:noFill/>
+        </p:spPr>
+        <p:txBody>
+          <a:bodyPr wrap="square" rtlCol="0">
+            <a:spAutoFit/>
+          </a:bodyPr>
+          <a:lstStyle/>
+          <a:p>
+            <a:r>
+              <a:rPr lang="zh-TW" altLang="en-US" sz="2000" b="1" dirty="0"/>
+              <a:t>*</a:t>
+            </a:r>
+            <a:r>
+              <a:rPr lang="en-NZ" altLang="zh-TW" sz="2000" b="1" dirty="0"/>
+              <a:t>All icons are from www.iconexperience.com</a:t>
+            </a:r>
+            <a:endParaRPr lang="en-NZ" sz="2000" b="1" dirty="0"/>
+          </a:p>
+        </p:txBody>
+      </p:sp>
       <p:pic>
         <p:nvPicPr>
-          <p:cNvPr id="1028" name="Picture 4" descr="Server Network Icon 256x256"/>
+          <p:cNvPr id="3" name="Picture 2" descr="Wlan Router Icon 128x128"/>
           <p:cNvPicPr>
             <a:picLocks noChangeAspect="1" noChangeArrowheads="1"/>
           </p:cNvPicPr>
@@ -3248,82 +3282,7 @@
         </p:blipFill>
         <p:spPr bwMode="auto">
           <a:xfrm>
-            <a:off x="10001828" y="2332547"/>
-            <a:ext cx="2016000" cy="2016000"/>
-          </a:xfrm>
-          <a:prstGeom prst="rect">
-            <a:avLst/>
-          </a:prstGeom>
-          <a:noFill/>
-          <a:extLst>
-            <a:ext uri="{909E8E84-426E-40DD-AFC4-6F175D3DCCD1}">
-              <a14:hiddenFill xmlns:a14="http://schemas.microsoft.com/office/drawing/2010/main">
-                <a:solidFill>
-                  <a:srgbClr val="FFFFFF"/>
-                </a:solidFill>
-              </a14:hiddenFill>
-            </a:ext>
-          </a:extLst>
-        </p:spPr>
-      </p:pic>
-      <p:sp>
-        <p:nvSpPr>
-          <p:cNvPr id="2" name="TextBox 1"/>
-          <p:cNvSpPr txBox="1"/>
-          <p:nvPr/>
-        </p:nvSpPr>
-        <p:spPr>
-          <a:xfrm>
-            <a:off x="597159" y="6027576"/>
-            <a:ext cx="5980923" cy="400110"/>
-          </a:xfrm>
-          <a:prstGeom prst="rect">
-            <a:avLst/>
-          </a:prstGeom>
-          <a:noFill/>
-        </p:spPr>
-        <p:txBody>
-          <a:bodyPr wrap="square" rtlCol="0">
-            <a:spAutoFit/>
-          </a:bodyPr>
-          <a:lstStyle/>
-          <a:p>
-            <a:r>
-              <a:rPr lang="zh-TW" altLang="en-US" sz="2000" b="1" dirty="0"/>
-              <a:t>*</a:t>
-            </a:r>
-            <a:r>
-              <a:rPr lang="en-NZ" altLang="zh-TW" sz="2000" b="1" dirty="0"/>
-              <a:t>All icons are from www.iconexperience.com</a:t>
-            </a:r>
-            <a:endParaRPr lang="en-NZ" sz="2000" b="1" dirty="0"/>
-          </a:p>
-        </p:txBody>
-      </p:sp>
-      <p:pic>
-        <p:nvPicPr>
-          <p:cNvPr id="3" name="Picture 2" descr="Wlan Router Icon 128x128"/>
-          <p:cNvPicPr>
-            <a:picLocks noChangeAspect="1" noChangeArrowheads="1"/>
-          </p:cNvPicPr>
-          <p:nvPr/>
-        </p:nvPicPr>
-        <p:blipFill>
-          <a:blip r:embed="rId4">
-            <a:extLst>
-              <a:ext uri="{28A0092B-C50C-407E-A947-70E740481C1C}">
-                <a14:useLocalDpi xmlns:a14="http://schemas.microsoft.com/office/drawing/2010/main" val="0"/>
-              </a:ext>
-            </a:extLst>
-          </a:blip>
-          <a:srcRect/>
-          <a:stretch>
-            <a:fillRect/>
-          </a:stretch>
-        </p:blipFill>
-        <p:spPr bwMode="auto">
-          <a:xfrm>
-            <a:off x="4097693" y="4099145"/>
+            <a:off x="10078616" y="2547151"/>
             <a:ext cx="1751823" cy="1751823"/>
           </a:xfrm>
           <a:prstGeom prst="rect">
@@ -3341,49 +3300,6 @@
           </a:extLst>
         </p:spPr>
       </p:pic>
-      <p:sp>
-        <p:nvSpPr>
-          <p:cNvPr id="7" name="TextBox 6"/>
-          <p:cNvSpPr txBox="1"/>
-          <p:nvPr/>
-        </p:nvSpPr>
-        <p:spPr>
-          <a:xfrm>
-            <a:off x="6141487" y="4823927"/>
-            <a:ext cx="2314770" cy="646331"/>
-          </a:xfrm>
-          <a:prstGeom prst="rect">
-            <a:avLst/>
-          </a:prstGeom>
-          <a:noFill/>
-          <a:ln>
-            <a:solidFill>
-              <a:schemeClr val="tx1"/>
-            </a:solidFill>
-          </a:ln>
-        </p:spPr>
-        <p:txBody>
-          <a:bodyPr wrap="square" rtlCol="0">
-            <a:spAutoFit/>
-          </a:bodyPr>
-          <a:lstStyle/>
-          <a:p>
-            <a:r>
-              <a:rPr lang="en-NZ" dirty="0"/>
-              <a:t>Router</a:t>
-            </a:r>
-            <a:r>
-              <a:rPr lang="zh-TW" altLang="en-US" dirty="0"/>
-              <a:t> </a:t>
-            </a:r>
-            <a:r>
-              <a:rPr lang="en-NZ" altLang="zh-TW" dirty="0"/>
-              <a:t>as mentioned in the question</a:t>
-            </a:r>
-            <a:endParaRPr lang="en-NZ" dirty="0"/>
-          </a:p>
-        </p:txBody>
-      </p:sp>
       <p:sp>
         <p:nvSpPr>
           <p:cNvPr id="9" name="TextBox 8"/>

</xml_diff>